<commit_message>
Display change. Adapt for a variable number of answers. Auto-adapt number of lines.
</commit_message>
<xml_diff>
--- a/psychometric_scale/stuff/instructionsBARATT.pptx
+++ b/psychometric_scale/stuff/instructionsBARATT.pptx
@@ -104,6 +104,11 @@
       </a:defRPr>
     </a:lvl9pPr>
   </p:defaultTextStyle>
+  <p:extLst>
+    <p:ext uri="{EFAFB233-063F-42B5-8137-9DF3F51BA10A}">
+      <p15:sldGuideLst xmlns:p15="http://schemas.microsoft.com/office/powerpoint/2012/main"/>
+    </p:ext>
+  </p:extLst>
 </p:presentation>
 </file>
 
@@ -149,10 +154,9 @@
           </a:lstStyle>
           <a:p>
             <a:r>
-              <a:rPr lang="fr-FR" smtClean="0"/>
+              <a:rPr lang="fr-FR"/>
               <a:t>Modifiez le style du titre</a:t>
             </a:r>
-            <a:endParaRPr lang="fr-FR"/>
           </a:p>
         </p:txBody>
       </p:sp>
@@ -214,10 +218,9 @@
           </a:lstStyle>
           <a:p>
             <a:r>
-              <a:rPr lang="fr-FR" smtClean="0"/>
+              <a:rPr lang="fr-FR"/>
               <a:t>Modifiez le style des sous-titres du masque</a:t>
             </a:r>
-            <a:endParaRPr lang="fr-FR"/>
           </a:p>
         </p:txBody>
       </p:sp>
@@ -238,7 +241,7 @@
           <a:p>
             <a:fld id="{44A49107-9334-444B-909C-23B4DE8E069D}" type="datetimeFigureOut">
               <a:rPr lang="fr-FR" smtClean="0"/>
-              <a:t>22/12/2015</a:t>
+              <a:t>15/04/2018</a:t>
             </a:fld>
             <a:endParaRPr lang="fr-FR"/>
           </a:p>
@@ -332,10 +335,9 @@
           <a:lstStyle/>
           <a:p>
             <a:r>
-              <a:rPr lang="fr-FR" smtClean="0"/>
+              <a:rPr lang="fr-FR"/>
               <a:t>Modifiez le style du titre</a:t>
             </a:r>
-            <a:endParaRPr lang="fr-FR"/>
           </a:p>
         </p:txBody>
       </p:sp>
@@ -356,38 +358,37 @@
           <a:p>
             <a:pPr lvl="0"/>
             <a:r>
-              <a:rPr lang="fr-FR" smtClean="0"/>
+              <a:rPr lang="fr-FR"/>
               <a:t>Modifiez les styles du texte du masque</a:t>
             </a:r>
           </a:p>
           <a:p>
             <a:pPr lvl="1"/>
             <a:r>
-              <a:rPr lang="fr-FR" smtClean="0"/>
+              <a:rPr lang="fr-FR"/>
               <a:t>Deuxième niveau</a:t>
             </a:r>
           </a:p>
           <a:p>
             <a:pPr lvl="2"/>
             <a:r>
-              <a:rPr lang="fr-FR" smtClean="0"/>
+              <a:rPr lang="fr-FR"/>
               <a:t>Troisième niveau</a:t>
             </a:r>
           </a:p>
           <a:p>
             <a:pPr lvl="3"/>
             <a:r>
-              <a:rPr lang="fr-FR" smtClean="0"/>
+              <a:rPr lang="fr-FR"/>
               <a:t>Quatrième niveau</a:t>
             </a:r>
           </a:p>
           <a:p>
             <a:pPr lvl="4"/>
             <a:r>
-              <a:rPr lang="fr-FR" smtClean="0"/>
+              <a:rPr lang="fr-FR"/>
               <a:t>Cinquième niveau</a:t>
             </a:r>
-            <a:endParaRPr lang="fr-FR"/>
           </a:p>
         </p:txBody>
       </p:sp>
@@ -408,7 +409,7 @@
           <a:p>
             <a:fld id="{44A49107-9334-444B-909C-23B4DE8E069D}" type="datetimeFigureOut">
               <a:rPr lang="fr-FR" smtClean="0"/>
-              <a:t>22/12/2015</a:t>
+              <a:t>15/04/2018</a:t>
             </a:fld>
             <a:endParaRPr lang="fr-FR"/>
           </a:p>
@@ -507,10 +508,9 @@
           <a:lstStyle/>
           <a:p>
             <a:r>
-              <a:rPr lang="fr-FR" smtClean="0"/>
+              <a:rPr lang="fr-FR"/>
               <a:t>Modifiez le style du titre</a:t>
             </a:r>
-            <a:endParaRPr lang="fr-FR"/>
           </a:p>
         </p:txBody>
       </p:sp>
@@ -536,38 +536,37 @@
           <a:p>
             <a:pPr lvl="0"/>
             <a:r>
-              <a:rPr lang="fr-FR" smtClean="0"/>
+              <a:rPr lang="fr-FR"/>
               <a:t>Modifiez les styles du texte du masque</a:t>
             </a:r>
           </a:p>
           <a:p>
             <a:pPr lvl="1"/>
             <a:r>
-              <a:rPr lang="fr-FR" smtClean="0"/>
+              <a:rPr lang="fr-FR"/>
               <a:t>Deuxième niveau</a:t>
             </a:r>
           </a:p>
           <a:p>
             <a:pPr lvl="2"/>
             <a:r>
-              <a:rPr lang="fr-FR" smtClean="0"/>
+              <a:rPr lang="fr-FR"/>
               <a:t>Troisième niveau</a:t>
             </a:r>
           </a:p>
           <a:p>
             <a:pPr lvl="3"/>
             <a:r>
-              <a:rPr lang="fr-FR" smtClean="0"/>
+              <a:rPr lang="fr-FR"/>
               <a:t>Quatrième niveau</a:t>
             </a:r>
           </a:p>
           <a:p>
             <a:pPr lvl="4"/>
             <a:r>
-              <a:rPr lang="fr-FR" smtClean="0"/>
+              <a:rPr lang="fr-FR"/>
               <a:t>Cinquième niveau</a:t>
             </a:r>
-            <a:endParaRPr lang="fr-FR"/>
           </a:p>
         </p:txBody>
       </p:sp>
@@ -588,7 +587,7 @@
           <a:p>
             <a:fld id="{44A49107-9334-444B-909C-23B4DE8E069D}" type="datetimeFigureOut">
               <a:rPr lang="fr-FR" smtClean="0"/>
-              <a:t>22/12/2015</a:t>
+              <a:t>15/04/2018</a:t>
             </a:fld>
             <a:endParaRPr lang="fr-FR"/>
           </a:p>
@@ -682,10 +681,9 @@
           <a:lstStyle/>
           <a:p>
             <a:r>
-              <a:rPr lang="fr-FR" smtClean="0"/>
+              <a:rPr lang="fr-FR"/>
               <a:t>Modifiez le style du titre</a:t>
             </a:r>
-            <a:endParaRPr lang="fr-FR"/>
           </a:p>
         </p:txBody>
       </p:sp>
@@ -706,38 +704,37 @@
           <a:p>
             <a:pPr lvl="0"/>
             <a:r>
-              <a:rPr lang="fr-FR" smtClean="0"/>
+              <a:rPr lang="fr-FR"/>
               <a:t>Modifiez les styles du texte du masque</a:t>
             </a:r>
           </a:p>
           <a:p>
             <a:pPr lvl="1"/>
             <a:r>
-              <a:rPr lang="fr-FR" smtClean="0"/>
+              <a:rPr lang="fr-FR"/>
               <a:t>Deuxième niveau</a:t>
             </a:r>
           </a:p>
           <a:p>
             <a:pPr lvl="2"/>
             <a:r>
-              <a:rPr lang="fr-FR" smtClean="0"/>
+              <a:rPr lang="fr-FR"/>
               <a:t>Troisième niveau</a:t>
             </a:r>
           </a:p>
           <a:p>
             <a:pPr lvl="3"/>
             <a:r>
-              <a:rPr lang="fr-FR" smtClean="0"/>
+              <a:rPr lang="fr-FR"/>
               <a:t>Quatrième niveau</a:t>
             </a:r>
           </a:p>
           <a:p>
             <a:pPr lvl="4"/>
             <a:r>
-              <a:rPr lang="fr-FR" smtClean="0"/>
+              <a:rPr lang="fr-FR"/>
               <a:t>Cinquième niveau</a:t>
             </a:r>
-            <a:endParaRPr lang="fr-FR"/>
           </a:p>
         </p:txBody>
       </p:sp>
@@ -758,7 +755,7 @@
           <a:p>
             <a:fld id="{44A49107-9334-444B-909C-23B4DE8E069D}" type="datetimeFigureOut">
               <a:rPr lang="fr-FR" smtClean="0"/>
-              <a:t>22/12/2015</a:t>
+              <a:t>15/04/2018</a:t>
             </a:fld>
             <a:endParaRPr lang="fr-FR"/>
           </a:p>
@@ -861,10 +858,9 @@
           </a:lstStyle>
           <a:p>
             <a:r>
-              <a:rPr lang="fr-FR" smtClean="0"/>
+              <a:rPr lang="fr-FR"/>
               <a:t>Modifiez le style du titre</a:t>
             </a:r>
-            <a:endParaRPr lang="fr-FR"/>
           </a:p>
         </p:txBody>
       </p:sp>
@@ -981,7 +977,7 @@
           <a:p>
             <a:pPr lvl="0"/>
             <a:r>
-              <a:rPr lang="fr-FR" smtClean="0"/>
+              <a:rPr lang="fr-FR"/>
               <a:t>Modifiez les styles du texte du masque</a:t>
             </a:r>
           </a:p>
@@ -1004,7 +1000,7 @@
           <a:p>
             <a:fld id="{44A49107-9334-444B-909C-23B4DE8E069D}" type="datetimeFigureOut">
               <a:rPr lang="fr-FR" smtClean="0"/>
-              <a:t>22/12/2015</a:t>
+              <a:t>15/04/2018</a:t>
             </a:fld>
             <a:endParaRPr lang="fr-FR"/>
           </a:p>
@@ -1098,10 +1094,9 @@
           <a:lstStyle/>
           <a:p>
             <a:r>
-              <a:rPr lang="fr-FR" smtClean="0"/>
+              <a:rPr lang="fr-FR"/>
               <a:t>Modifiez le style du titre</a:t>
             </a:r>
-            <a:endParaRPr lang="fr-FR"/>
           </a:p>
         </p:txBody>
       </p:sp>
@@ -1127,38 +1122,37 @@
           <a:p>
             <a:pPr lvl="0"/>
             <a:r>
-              <a:rPr lang="fr-FR" smtClean="0"/>
+              <a:rPr lang="fr-FR"/>
               <a:t>Modifiez les styles du texte du masque</a:t>
             </a:r>
           </a:p>
           <a:p>
             <a:pPr lvl="1"/>
             <a:r>
-              <a:rPr lang="fr-FR" smtClean="0"/>
+              <a:rPr lang="fr-FR"/>
               <a:t>Deuxième niveau</a:t>
             </a:r>
           </a:p>
           <a:p>
             <a:pPr lvl="2"/>
             <a:r>
-              <a:rPr lang="fr-FR" smtClean="0"/>
+              <a:rPr lang="fr-FR"/>
               <a:t>Troisième niveau</a:t>
             </a:r>
           </a:p>
           <a:p>
             <a:pPr lvl="3"/>
             <a:r>
-              <a:rPr lang="fr-FR" smtClean="0"/>
+              <a:rPr lang="fr-FR"/>
               <a:t>Quatrième niveau</a:t>
             </a:r>
           </a:p>
           <a:p>
             <a:pPr lvl="4"/>
             <a:r>
-              <a:rPr lang="fr-FR" smtClean="0"/>
+              <a:rPr lang="fr-FR"/>
               <a:t>Cinquième niveau</a:t>
             </a:r>
-            <a:endParaRPr lang="fr-FR"/>
           </a:p>
         </p:txBody>
       </p:sp>
@@ -1184,38 +1178,37 @@
           <a:p>
             <a:pPr lvl="0"/>
             <a:r>
-              <a:rPr lang="fr-FR" smtClean="0"/>
+              <a:rPr lang="fr-FR"/>
               <a:t>Modifiez les styles du texte du masque</a:t>
             </a:r>
           </a:p>
           <a:p>
             <a:pPr lvl="1"/>
             <a:r>
-              <a:rPr lang="fr-FR" smtClean="0"/>
+              <a:rPr lang="fr-FR"/>
               <a:t>Deuxième niveau</a:t>
             </a:r>
           </a:p>
           <a:p>
             <a:pPr lvl="2"/>
             <a:r>
-              <a:rPr lang="fr-FR" smtClean="0"/>
+              <a:rPr lang="fr-FR"/>
               <a:t>Troisième niveau</a:t>
             </a:r>
           </a:p>
           <a:p>
             <a:pPr lvl="3"/>
             <a:r>
-              <a:rPr lang="fr-FR" smtClean="0"/>
+              <a:rPr lang="fr-FR"/>
               <a:t>Quatrième niveau</a:t>
             </a:r>
           </a:p>
           <a:p>
             <a:pPr lvl="4"/>
             <a:r>
-              <a:rPr lang="fr-FR" smtClean="0"/>
+              <a:rPr lang="fr-FR"/>
               <a:t>Cinquième niveau</a:t>
             </a:r>
-            <a:endParaRPr lang="fr-FR"/>
           </a:p>
         </p:txBody>
       </p:sp>
@@ -1236,7 +1229,7 @@
           <a:p>
             <a:fld id="{44A49107-9334-444B-909C-23B4DE8E069D}" type="datetimeFigureOut">
               <a:rPr lang="fr-FR" smtClean="0"/>
-              <a:t>22/12/2015</a:t>
+              <a:t>15/04/2018</a:t>
             </a:fld>
             <a:endParaRPr lang="fr-FR"/>
           </a:p>
@@ -1335,10 +1328,9 @@
           <a:lstStyle/>
           <a:p>
             <a:r>
-              <a:rPr lang="fr-FR" smtClean="0"/>
+              <a:rPr lang="fr-FR"/>
               <a:t>Modifiez le style du titre</a:t>
             </a:r>
-            <a:endParaRPr lang="fr-FR"/>
           </a:p>
         </p:txBody>
       </p:sp>
@@ -1401,7 +1393,7 @@
           <a:p>
             <a:pPr lvl="0"/>
             <a:r>
-              <a:rPr lang="fr-FR" smtClean="0"/>
+              <a:rPr lang="fr-FR"/>
               <a:t>Modifiez les styles du texte du masque</a:t>
             </a:r>
           </a:p>
@@ -1429,38 +1421,37 @@
           <a:p>
             <a:pPr lvl="0"/>
             <a:r>
-              <a:rPr lang="fr-FR" smtClean="0"/>
+              <a:rPr lang="fr-FR"/>
               <a:t>Modifiez les styles du texte du masque</a:t>
             </a:r>
           </a:p>
           <a:p>
             <a:pPr lvl="1"/>
             <a:r>
-              <a:rPr lang="fr-FR" smtClean="0"/>
+              <a:rPr lang="fr-FR"/>
               <a:t>Deuxième niveau</a:t>
             </a:r>
           </a:p>
           <a:p>
             <a:pPr lvl="2"/>
             <a:r>
-              <a:rPr lang="fr-FR" smtClean="0"/>
+              <a:rPr lang="fr-FR"/>
               <a:t>Troisième niveau</a:t>
             </a:r>
           </a:p>
           <a:p>
             <a:pPr lvl="3"/>
             <a:r>
-              <a:rPr lang="fr-FR" smtClean="0"/>
+              <a:rPr lang="fr-FR"/>
               <a:t>Quatrième niveau</a:t>
             </a:r>
           </a:p>
           <a:p>
             <a:pPr lvl="4"/>
             <a:r>
-              <a:rPr lang="fr-FR" smtClean="0"/>
+              <a:rPr lang="fr-FR"/>
               <a:t>Cinquième niveau</a:t>
             </a:r>
-            <a:endParaRPr lang="fr-FR"/>
           </a:p>
         </p:txBody>
       </p:sp>
@@ -1523,7 +1514,7 @@
           <a:p>
             <a:pPr lvl="0"/>
             <a:r>
-              <a:rPr lang="fr-FR" smtClean="0"/>
+              <a:rPr lang="fr-FR"/>
               <a:t>Modifiez les styles du texte du masque</a:t>
             </a:r>
           </a:p>
@@ -1551,38 +1542,37 @@
           <a:p>
             <a:pPr lvl="0"/>
             <a:r>
-              <a:rPr lang="fr-FR" smtClean="0"/>
+              <a:rPr lang="fr-FR"/>
               <a:t>Modifiez les styles du texte du masque</a:t>
             </a:r>
           </a:p>
           <a:p>
             <a:pPr lvl="1"/>
             <a:r>
-              <a:rPr lang="fr-FR" smtClean="0"/>
+              <a:rPr lang="fr-FR"/>
               <a:t>Deuxième niveau</a:t>
             </a:r>
           </a:p>
           <a:p>
             <a:pPr lvl="2"/>
             <a:r>
-              <a:rPr lang="fr-FR" smtClean="0"/>
+              <a:rPr lang="fr-FR"/>
               <a:t>Troisième niveau</a:t>
             </a:r>
           </a:p>
           <a:p>
             <a:pPr lvl="3"/>
             <a:r>
-              <a:rPr lang="fr-FR" smtClean="0"/>
+              <a:rPr lang="fr-FR"/>
               <a:t>Quatrième niveau</a:t>
             </a:r>
           </a:p>
           <a:p>
             <a:pPr lvl="4"/>
             <a:r>
-              <a:rPr lang="fr-FR" smtClean="0"/>
+              <a:rPr lang="fr-FR"/>
               <a:t>Cinquième niveau</a:t>
             </a:r>
-            <a:endParaRPr lang="fr-FR"/>
           </a:p>
         </p:txBody>
       </p:sp>
@@ -1603,7 +1593,7 @@
           <a:p>
             <a:fld id="{44A49107-9334-444B-909C-23B4DE8E069D}" type="datetimeFigureOut">
               <a:rPr lang="fr-FR" smtClean="0"/>
-              <a:t>22/12/2015</a:t>
+              <a:t>15/04/2018</a:t>
             </a:fld>
             <a:endParaRPr lang="fr-FR"/>
           </a:p>
@@ -1697,10 +1687,9 @@
           <a:lstStyle/>
           <a:p>
             <a:r>
-              <a:rPr lang="fr-FR" smtClean="0"/>
+              <a:rPr lang="fr-FR"/>
               <a:t>Modifiez le style du titre</a:t>
             </a:r>
-            <a:endParaRPr lang="fr-FR"/>
           </a:p>
         </p:txBody>
       </p:sp>
@@ -1721,7 +1710,7 @@
           <a:p>
             <a:fld id="{44A49107-9334-444B-909C-23B4DE8E069D}" type="datetimeFigureOut">
               <a:rPr lang="fr-FR" smtClean="0"/>
-              <a:t>22/12/2015</a:t>
+              <a:t>15/04/2018</a:t>
             </a:fld>
             <a:endParaRPr lang="fr-FR"/>
           </a:p>
@@ -1816,7 +1805,7 @@
           <a:p>
             <a:fld id="{44A49107-9334-444B-909C-23B4DE8E069D}" type="datetimeFigureOut">
               <a:rPr lang="fr-FR" smtClean="0"/>
-              <a:t>22/12/2015</a:t>
+              <a:t>15/04/2018</a:t>
             </a:fld>
             <a:endParaRPr lang="fr-FR"/>
           </a:p>
@@ -1919,10 +1908,9 @@
           </a:lstStyle>
           <a:p>
             <a:r>
-              <a:rPr lang="fr-FR" smtClean="0"/>
+              <a:rPr lang="fr-FR"/>
               <a:t>Modifiez le style du titre</a:t>
             </a:r>
-            <a:endParaRPr lang="fr-FR"/>
           </a:p>
         </p:txBody>
       </p:sp>
@@ -1976,38 +1964,37 @@
           <a:p>
             <a:pPr lvl="0"/>
             <a:r>
-              <a:rPr lang="fr-FR" smtClean="0"/>
+              <a:rPr lang="fr-FR"/>
               <a:t>Modifiez les styles du texte du masque</a:t>
             </a:r>
           </a:p>
           <a:p>
             <a:pPr lvl="1"/>
             <a:r>
-              <a:rPr lang="fr-FR" smtClean="0"/>
+              <a:rPr lang="fr-FR"/>
               <a:t>Deuxième niveau</a:t>
             </a:r>
           </a:p>
           <a:p>
             <a:pPr lvl="2"/>
             <a:r>
-              <a:rPr lang="fr-FR" smtClean="0"/>
+              <a:rPr lang="fr-FR"/>
               <a:t>Troisième niveau</a:t>
             </a:r>
           </a:p>
           <a:p>
             <a:pPr lvl="3"/>
             <a:r>
-              <a:rPr lang="fr-FR" smtClean="0"/>
+              <a:rPr lang="fr-FR"/>
               <a:t>Quatrième niveau</a:t>
             </a:r>
           </a:p>
           <a:p>
             <a:pPr lvl="4"/>
             <a:r>
-              <a:rPr lang="fr-FR" smtClean="0"/>
+              <a:rPr lang="fr-FR"/>
               <a:t>Cinquième niveau</a:t>
             </a:r>
-            <a:endParaRPr lang="fr-FR"/>
           </a:p>
         </p:txBody>
       </p:sp>
@@ -2070,7 +2057,7 @@
           <a:p>
             <a:pPr lvl="0"/>
             <a:r>
-              <a:rPr lang="fr-FR" smtClean="0"/>
+              <a:rPr lang="fr-FR"/>
               <a:t>Modifiez les styles du texte du masque</a:t>
             </a:r>
           </a:p>
@@ -2093,7 +2080,7 @@
           <a:p>
             <a:fld id="{44A49107-9334-444B-909C-23B4DE8E069D}" type="datetimeFigureOut">
               <a:rPr lang="fr-FR" smtClean="0"/>
-              <a:t>22/12/2015</a:t>
+              <a:t>15/04/2018</a:t>
             </a:fld>
             <a:endParaRPr lang="fr-FR"/>
           </a:p>
@@ -2196,10 +2183,9 @@
           </a:lstStyle>
           <a:p>
             <a:r>
-              <a:rPr lang="fr-FR" smtClean="0"/>
+              <a:rPr lang="fr-FR"/>
               <a:t>Modifiez le style du titre</a:t>
             </a:r>
-            <a:endParaRPr lang="fr-FR"/>
           </a:p>
         </p:txBody>
       </p:sp>
@@ -2323,7 +2309,7 @@
           <a:p>
             <a:pPr lvl="0"/>
             <a:r>
-              <a:rPr lang="fr-FR" smtClean="0"/>
+              <a:rPr lang="fr-FR"/>
               <a:t>Modifiez les styles du texte du masque</a:t>
             </a:r>
           </a:p>
@@ -2346,7 +2332,7 @@
           <a:p>
             <a:fld id="{44A49107-9334-444B-909C-23B4DE8E069D}" type="datetimeFigureOut">
               <a:rPr lang="fr-FR" smtClean="0"/>
-              <a:t>22/12/2015</a:t>
+              <a:t>15/04/2018</a:t>
             </a:fld>
             <a:endParaRPr lang="fr-FR"/>
           </a:p>
@@ -2455,10 +2441,9 @@
           <a:lstStyle/>
           <a:p>
             <a:r>
-              <a:rPr lang="fr-FR" smtClean="0"/>
+              <a:rPr lang="fr-FR"/>
               <a:t>Modifiez le style du titre</a:t>
             </a:r>
-            <a:endParaRPr lang="fr-FR"/>
           </a:p>
         </p:txBody>
       </p:sp>
@@ -2489,38 +2474,37 @@
           <a:p>
             <a:pPr lvl="0"/>
             <a:r>
-              <a:rPr lang="fr-FR" smtClean="0"/>
+              <a:rPr lang="fr-FR"/>
               <a:t>Modifiez les styles du texte du masque</a:t>
             </a:r>
           </a:p>
           <a:p>
             <a:pPr lvl="1"/>
             <a:r>
-              <a:rPr lang="fr-FR" smtClean="0"/>
+              <a:rPr lang="fr-FR"/>
               <a:t>Deuxième niveau</a:t>
             </a:r>
           </a:p>
           <a:p>
             <a:pPr lvl="2"/>
             <a:r>
-              <a:rPr lang="fr-FR" smtClean="0"/>
+              <a:rPr lang="fr-FR"/>
               <a:t>Troisième niveau</a:t>
             </a:r>
           </a:p>
           <a:p>
             <a:pPr lvl="3"/>
             <a:r>
-              <a:rPr lang="fr-FR" smtClean="0"/>
+              <a:rPr lang="fr-FR"/>
               <a:t>Quatrième niveau</a:t>
             </a:r>
           </a:p>
           <a:p>
             <a:pPr lvl="4"/>
             <a:r>
-              <a:rPr lang="fr-FR" smtClean="0"/>
+              <a:rPr lang="fr-FR"/>
               <a:t>Cinquième niveau</a:t>
             </a:r>
-            <a:endParaRPr lang="fr-FR"/>
           </a:p>
         </p:txBody>
       </p:sp>
@@ -2559,7 +2543,7 @@
           <a:p>
             <a:fld id="{44A49107-9334-444B-909C-23B4DE8E069D}" type="datetimeFigureOut">
               <a:rPr lang="fr-FR" smtClean="0"/>
-              <a:t>22/12/2015</a:t>
+              <a:t>15/04/2018</a:t>
             </a:fld>
             <a:endParaRPr lang="fr-FR"/>
           </a:p>
@@ -2981,7 +2965,7 @@
         <p:spPr>
           <a:xfrm>
             <a:off x="367392" y="1412422"/>
-            <a:ext cx="11291207" cy="4031873"/>
+            <a:ext cx="11291207" cy="3046988"/>
           </a:xfrm>
           <a:prstGeom prst="rect">
             <a:avLst/>
@@ -2996,7 +2980,7 @@
           <a:p>
             <a:pPr algn="ctr"/>
             <a:r>
-              <a:rPr lang="fr-FR" sz="3200" dirty="0" smtClean="0">
+              <a:rPr lang="fr-FR" sz="3200" dirty="0">
                 <a:solidFill>
                   <a:schemeClr val="bg1"/>
                 </a:solidFill>
@@ -3015,7 +2999,7 @@
           <a:p>
             <a:pPr algn="ctr"/>
             <a:r>
-              <a:rPr lang="fr-FR" sz="3200" dirty="0" smtClean="0">
+              <a:rPr lang="fr-FR" sz="3200" dirty="0">
                 <a:solidFill>
                   <a:schemeClr val="bg1"/>
                 </a:solidFill>
@@ -3025,22 +3009,6 @@
           </a:p>
           <a:p>
             <a:pPr algn="ctr"/>
-            <a:endParaRPr lang="fr-FR" sz="3200" dirty="0">
-              <a:solidFill>
-                <a:schemeClr val="bg1"/>
-              </a:solidFill>
-            </a:endParaRPr>
-          </a:p>
-          <a:p>
-            <a:pPr algn="ctr"/>
-            <a:r>
-              <a:rPr lang="fr-FR" sz="3200" dirty="0" smtClean="0">
-                <a:solidFill>
-                  <a:schemeClr val="bg1"/>
-                </a:solidFill>
-              </a:rPr>
-              <a:t>Pour chaque affirmation, répondez en utilisant les flèches directionnelles puis validez avec la touche contrôle.</a:t>
-            </a:r>
             <a:endParaRPr lang="fr-FR" sz="3200" dirty="0">
               <a:solidFill>
                 <a:schemeClr val="bg1"/>

</xml_diff>

<commit_message>
adaptation to new scales
</commit_message>
<xml_diff>
--- a/psychometric_scale/stuff/instructionsBARATT.pptx
+++ b/psychometric_scale/stuff/instructionsBARATT.pptx
@@ -241,7 +241,7 @@
           <a:p>
             <a:fld id="{44A49107-9334-444B-909C-23B4DE8E069D}" type="datetimeFigureOut">
               <a:rPr lang="fr-FR" smtClean="0"/>
-              <a:t>15/04/2018</a:t>
+              <a:t>30/05/2018</a:t>
             </a:fld>
             <a:endParaRPr lang="fr-FR"/>
           </a:p>
@@ -283,7 +283,7 @@
           <a:p>
             <a:fld id="{8E474E87-316C-4201-83D8-6EEAD59357E5}" type="slidenum">
               <a:rPr lang="fr-FR" smtClean="0"/>
-              <a:t>‹N°›</a:t>
+              <a:t>‹#›</a:t>
             </a:fld>
             <a:endParaRPr lang="fr-FR"/>
           </a:p>
@@ -409,7 +409,7 @@
           <a:p>
             <a:fld id="{44A49107-9334-444B-909C-23B4DE8E069D}" type="datetimeFigureOut">
               <a:rPr lang="fr-FR" smtClean="0"/>
-              <a:t>15/04/2018</a:t>
+              <a:t>30/05/2018</a:t>
             </a:fld>
             <a:endParaRPr lang="fr-FR"/>
           </a:p>
@@ -451,7 +451,7 @@
           <a:p>
             <a:fld id="{8E474E87-316C-4201-83D8-6EEAD59357E5}" type="slidenum">
               <a:rPr lang="fr-FR" smtClean="0"/>
-              <a:t>‹N°›</a:t>
+              <a:t>‹#›</a:t>
             </a:fld>
             <a:endParaRPr lang="fr-FR"/>
           </a:p>
@@ -587,7 +587,7 @@
           <a:p>
             <a:fld id="{44A49107-9334-444B-909C-23B4DE8E069D}" type="datetimeFigureOut">
               <a:rPr lang="fr-FR" smtClean="0"/>
-              <a:t>15/04/2018</a:t>
+              <a:t>30/05/2018</a:t>
             </a:fld>
             <a:endParaRPr lang="fr-FR"/>
           </a:p>
@@ -629,7 +629,7 @@
           <a:p>
             <a:fld id="{8E474E87-316C-4201-83D8-6EEAD59357E5}" type="slidenum">
               <a:rPr lang="fr-FR" smtClean="0"/>
-              <a:t>‹N°›</a:t>
+              <a:t>‹#›</a:t>
             </a:fld>
             <a:endParaRPr lang="fr-FR"/>
           </a:p>
@@ -755,7 +755,7 @@
           <a:p>
             <a:fld id="{44A49107-9334-444B-909C-23B4DE8E069D}" type="datetimeFigureOut">
               <a:rPr lang="fr-FR" smtClean="0"/>
-              <a:t>15/04/2018</a:t>
+              <a:t>30/05/2018</a:t>
             </a:fld>
             <a:endParaRPr lang="fr-FR"/>
           </a:p>
@@ -797,7 +797,7 @@
           <a:p>
             <a:fld id="{8E474E87-316C-4201-83D8-6EEAD59357E5}" type="slidenum">
               <a:rPr lang="fr-FR" smtClean="0"/>
-              <a:t>‹N°›</a:t>
+              <a:t>‹#›</a:t>
             </a:fld>
             <a:endParaRPr lang="fr-FR"/>
           </a:p>
@@ -1000,7 +1000,7 @@
           <a:p>
             <a:fld id="{44A49107-9334-444B-909C-23B4DE8E069D}" type="datetimeFigureOut">
               <a:rPr lang="fr-FR" smtClean="0"/>
-              <a:t>15/04/2018</a:t>
+              <a:t>30/05/2018</a:t>
             </a:fld>
             <a:endParaRPr lang="fr-FR"/>
           </a:p>
@@ -1042,7 +1042,7 @@
           <a:p>
             <a:fld id="{8E474E87-316C-4201-83D8-6EEAD59357E5}" type="slidenum">
               <a:rPr lang="fr-FR" smtClean="0"/>
-              <a:t>‹N°›</a:t>
+              <a:t>‹#›</a:t>
             </a:fld>
             <a:endParaRPr lang="fr-FR"/>
           </a:p>
@@ -1229,7 +1229,7 @@
           <a:p>
             <a:fld id="{44A49107-9334-444B-909C-23B4DE8E069D}" type="datetimeFigureOut">
               <a:rPr lang="fr-FR" smtClean="0"/>
-              <a:t>15/04/2018</a:t>
+              <a:t>30/05/2018</a:t>
             </a:fld>
             <a:endParaRPr lang="fr-FR"/>
           </a:p>
@@ -1271,7 +1271,7 @@
           <a:p>
             <a:fld id="{8E474E87-316C-4201-83D8-6EEAD59357E5}" type="slidenum">
               <a:rPr lang="fr-FR" smtClean="0"/>
-              <a:t>‹N°›</a:t>
+              <a:t>‹#›</a:t>
             </a:fld>
             <a:endParaRPr lang="fr-FR"/>
           </a:p>
@@ -1593,7 +1593,7 @@
           <a:p>
             <a:fld id="{44A49107-9334-444B-909C-23B4DE8E069D}" type="datetimeFigureOut">
               <a:rPr lang="fr-FR" smtClean="0"/>
-              <a:t>15/04/2018</a:t>
+              <a:t>30/05/2018</a:t>
             </a:fld>
             <a:endParaRPr lang="fr-FR"/>
           </a:p>
@@ -1635,7 +1635,7 @@
           <a:p>
             <a:fld id="{8E474E87-316C-4201-83D8-6EEAD59357E5}" type="slidenum">
               <a:rPr lang="fr-FR" smtClean="0"/>
-              <a:t>‹N°›</a:t>
+              <a:t>‹#›</a:t>
             </a:fld>
             <a:endParaRPr lang="fr-FR"/>
           </a:p>
@@ -1710,7 +1710,7 @@
           <a:p>
             <a:fld id="{44A49107-9334-444B-909C-23B4DE8E069D}" type="datetimeFigureOut">
               <a:rPr lang="fr-FR" smtClean="0"/>
-              <a:t>15/04/2018</a:t>
+              <a:t>30/05/2018</a:t>
             </a:fld>
             <a:endParaRPr lang="fr-FR"/>
           </a:p>
@@ -1752,7 +1752,7 @@
           <a:p>
             <a:fld id="{8E474E87-316C-4201-83D8-6EEAD59357E5}" type="slidenum">
               <a:rPr lang="fr-FR" smtClean="0"/>
-              <a:t>‹N°›</a:t>
+              <a:t>‹#›</a:t>
             </a:fld>
             <a:endParaRPr lang="fr-FR"/>
           </a:p>
@@ -1805,7 +1805,7 @@
           <a:p>
             <a:fld id="{44A49107-9334-444B-909C-23B4DE8E069D}" type="datetimeFigureOut">
               <a:rPr lang="fr-FR" smtClean="0"/>
-              <a:t>15/04/2018</a:t>
+              <a:t>30/05/2018</a:t>
             </a:fld>
             <a:endParaRPr lang="fr-FR"/>
           </a:p>
@@ -1847,7 +1847,7 @@
           <a:p>
             <a:fld id="{8E474E87-316C-4201-83D8-6EEAD59357E5}" type="slidenum">
               <a:rPr lang="fr-FR" smtClean="0"/>
-              <a:t>‹N°›</a:t>
+              <a:t>‹#›</a:t>
             </a:fld>
             <a:endParaRPr lang="fr-FR"/>
           </a:p>
@@ -2080,7 +2080,7 @@
           <a:p>
             <a:fld id="{44A49107-9334-444B-909C-23B4DE8E069D}" type="datetimeFigureOut">
               <a:rPr lang="fr-FR" smtClean="0"/>
-              <a:t>15/04/2018</a:t>
+              <a:t>30/05/2018</a:t>
             </a:fld>
             <a:endParaRPr lang="fr-FR"/>
           </a:p>
@@ -2122,7 +2122,7 @@
           <a:p>
             <a:fld id="{8E474E87-316C-4201-83D8-6EEAD59357E5}" type="slidenum">
               <a:rPr lang="fr-FR" smtClean="0"/>
-              <a:t>‹N°›</a:t>
+              <a:t>‹#›</a:t>
             </a:fld>
             <a:endParaRPr lang="fr-FR"/>
           </a:p>
@@ -2332,7 +2332,7 @@
           <a:p>
             <a:fld id="{44A49107-9334-444B-909C-23B4DE8E069D}" type="datetimeFigureOut">
               <a:rPr lang="fr-FR" smtClean="0"/>
-              <a:t>15/04/2018</a:t>
+              <a:t>30/05/2018</a:t>
             </a:fld>
             <a:endParaRPr lang="fr-FR"/>
           </a:p>
@@ -2374,7 +2374,7 @@
           <a:p>
             <a:fld id="{8E474E87-316C-4201-83D8-6EEAD59357E5}" type="slidenum">
               <a:rPr lang="fr-FR" smtClean="0"/>
-              <a:t>‹N°›</a:t>
+              <a:t>‹#›</a:t>
             </a:fld>
             <a:endParaRPr lang="fr-FR"/>
           </a:p>
@@ -2543,7 +2543,7 @@
           <a:p>
             <a:fld id="{44A49107-9334-444B-909C-23B4DE8E069D}" type="datetimeFigureOut">
               <a:rPr lang="fr-FR" smtClean="0"/>
-              <a:t>15/04/2018</a:t>
+              <a:t>30/05/2018</a:t>
             </a:fld>
             <a:endParaRPr lang="fr-FR"/>
           </a:p>
@@ -2621,7 +2621,7 @@
           <a:p>
             <a:fld id="{8E474E87-316C-4201-83D8-6EEAD59357E5}" type="slidenum">
               <a:rPr lang="fr-FR" smtClean="0"/>
-              <a:t>‹N°›</a:t>
+              <a:t>‹#›</a:t>
             </a:fld>
             <a:endParaRPr lang="fr-FR"/>
           </a:p>
@@ -2964,8 +2964,8 @@
         </p:nvSpPr>
         <p:spPr>
           <a:xfrm>
-            <a:off x="367392" y="1412422"/>
-            <a:ext cx="11291207" cy="3046988"/>
+            <a:off x="450397" y="520324"/>
+            <a:ext cx="11291207" cy="5016758"/>
           </a:xfrm>
           <a:prstGeom prst="rect">
             <a:avLst/>
@@ -2977,6 +2977,44 @@
             <a:spAutoFit/>
           </a:bodyPr>
           <a:lstStyle/>
+          <a:p>
+            <a:pPr algn="ctr"/>
+            <a:r>
+              <a:rPr lang="fr-FR" sz="3200" b="1" dirty="0">
+                <a:solidFill>
+                  <a:schemeClr val="bg1"/>
+                </a:solidFill>
+              </a:rPr>
+              <a:t>ÉCHELLE D’IMPULSIVITÉ DE BARRATT</a:t>
+            </a:r>
+          </a:p>
+          <a:p>
+            <a:pPr algn="ctr"/>
+            <a:r>
+              <a:rPr lang="fr-FR" sz="3200" b="1" dirty="0">
+                <a:solidFill>
+                  <a:schemeClr val="bg1"/>
+                </a:solidFill>
+              </a:rPr>
+              <a:t>(BIS-11)</a:t>
+            </a:r>
+          </a:p>
+          <a:p>
+            <a:pPr algn="ctr"/>
+            <a:endParaRPr lang="fr-FR" sz="3200" dirty="0">
+              <a:solidFill>
+                <a:schemeClr val="bg1"/>
+              </a:solidFill>
+            </a:endParaRPr>
+          </a:p>
+          <a:p>
+            <a:pPr algn="ctr"/>
+            <a:endParaRPr lang="fr-FR" sz="3200" dirty="0">
+              <a:solidFill>
+                <a:schemeClr val="bg1"/>
+              </a:solidFill>
+            </a:endParaRPr>
+          </a:p>
           <a:p>
             <a:pPr algn="ctr"/>
             <a:r>

</xml_diff>